<commit_message>
rachel updated README and added screenshots
</commit_message>
<xml_diff>
--- a/Group-1-presentation.pptx
+++ b/Group-1-presentation.pptx
@@ -129,7 +129,7 @@
 <file path=ppt/revisionInfo.xml><?xml version="1.0" encoding="utf-8"?>
 <p1510:revInfo xmlns:a="http://schemas.openxmlformats.org/drawingml/2006/main" xmlns:r="http://schemas.openxmlformats.org/officeDocument/2006/relationships" xmlns:p1510="http://schemas.microsoft.com/office/powerpoint/2015/10/main">
   <p1510:revLst>
-    <p1510:client id="{B67FC079-14DA-4421-84A6-07B24D593E19}" v="62" dt="2024-01-29T10:42:06.851"/>
+    <p1510:client id="{B67FC079-14DA-4421-84A6-07B24D593E19}" v="68" dt="2024-01-29T10:43:35.134"/>
     <p1510:client id="{DD4789E4-EDAB-4522-ABDD-8EAA284E23DA}" v="1324" dt="2024-01-28T08:38:23.648"/>
   </p1510:revLst>
 </p1510:revInfo>
@@ -202,18 +202,18 @@
   <pc:docChgLst>
     <pc:chgData name="Aleksandra Czynszak" userId="01262a58ac33bcee" providerId="Windows Live" clId="Web-{B67FC079-14DA-4421-84A6-07B24D593E19}"/>
     <pc:docChg chg="modSld">
-      <pc:chgData name="Aleksandra Czynszak" userId="01262a58ac33bcee" providerId="Windows Live" clId="Web-{B67FC079-14DA-4421-84A6-07B24D593E19}" dt="2024-01-29T10:42:06.851" v="61" actId="20577"/>
+      <pc:chgData name="Aleksandra Czynszak" userId="01262a58ac33bcee" providerId="Windows Live" clId="Web-{B67FC079-14DA-4421-84A6-07B24D593E19}" dt="2024-01-29T10:43:35.134" v="67" actId="20577"/>
       <pc:docMkLst>
         <pc:docMk/>
       </pc:docMkLst>
       <pc:sldChg chg="modSp">
-        <pc:chgData name="Aleksandra Czynszak" userId="01262a58ac33bcee" providerId="Windows Live" clId="Web-{B67FC079-14DA-4421-84A6-07B24D593E19}" dt="2024-01-29T10:42:06.851" v="61" actId="20577"/>
+        <pc:chgData name="Aleksandra Czynszak" userId="01262a58ac33bcee" providerId="Windows Live" clId="Web-{B67FC079-14DA-4421-84A6-07B24D593E19}" dt="2024-01-29T10:43:35.134" v="67" actId="20577"/>
         <pc:sldMkLst>
           <pc:docMk/>
           <pc:sldMk cId="285283181" sldId="261"/>
         </pc:sldMkLst>
         <pc:spChg chg="mod">
-          <ac:chgData name="Aleksandra Czynszak" userId="01262a58ac33bcee" providerId="Windows Live" clId="Web-{B67FC079-14DA-4421-84A6-07B24D593E19}" dt="2024-01-29T10:42:06.851" v="61" actId="20577"/>
+          <ac:chgData name="Aleksandra Czynszak" userId="01262a58ac33bcee" providerId="Windows Live" clId="Web-{B67FC079-14DA-4421-84A6-07B24D593E19}" dt="2024-01-29T10:43:35.134" v="67" actId="20577"/>
           <ac:spMkLst>
             <pc:docMk/>
             <pc:sldMk cId="285283181" sldId="261"/>
@@ -15344,11 +15344,14 @@
               </a:rPr>
             </a:br>
             <a:r>
-              <a:rPr lang="en-US" sz="1600">
-                <a:latin typeface="Arial"/>
-                <a:cs typeface="Arial"/>
+              <a:rPr lang="en-US" sz="1500">
+                <a:solidFill>
+                  <a:schemeClr val="tx1"/>
+                </a:solidFill>
+                <a:ea typeface="+mn-lt"/>
+                <a:cs typeface="+mn-lt"/>
               </a:rPr>
-              <a:t>Yes, gender certainly has impact on life expectancy.</a:t>
+              <a:t>Gender significantly influences life expectancy, as females consistently show higher median values (84-86 years) compared to males (80-82 years).</a:t>
             </a:r>
           </a:p>
         </p:txBody>

</xml_diff>